<commit_message>
pushing the code from the prior commit
</commit_message>
<xml_diff>
--- a/ClassMaterials/MergeSort/Slides/MergeSort.pptx
+++ b/ClassMaterials/MergeSort/Slides/MergeSort.pptx
@@ -305,7 +305,7 @@
               <a:pPr>
                 <a:defRPr/>
               </a:pPr>
-              <a:t>2/19/2021</a:t>
+              <a:t>5/9/2020</a:t>
             </a:fld>
             <a:endParaRPr lang="en-US"/>
           </a:p>
@@ -540,7 +540,7 @@
               <a:pPr>
                 <a:defRPr/>
               </a:pPr>
-              <a:t>2/19/2021</a:t>
+              <a:t>5/9/2020</a:t>
             </a:fld>
             <a:endParaRPr lang="en-US"/>
           </a:p>
@@ -2316,7 +2316,7 @@
               <a:pPr>
                 <a:defRPr/>
               </a:pPr>
-              <a:t>Friday, February 19, 2021</a:t>
+              <a:t>Saturday, May 9, 2020</a:t>
             </a:fld>
             <a:endParaRPr lang="en-US" dirty="0"/>
           </a:p>
@@ -2501,7 +2501,7 @@
               <a:pPr>
                 <a:defRPr/>
               </a:pPr>
-              <a:t>Friday, February 19, 2021</a:t>
+              <a:t>Saturday, May 9, 2020</a:t>
             </a:fld>
             <a:endParaRPr lang="en-US" dirty="0"/>
           </a:p>
@@ -2696,7 +2696,7 @@
               <a:pPr>
                 <a:defRPr/>
               </a:pPr>
-              <a:t>Friday, February 19, 2021</a:t>
+              <a:t>Saturday, May 9, 2020</a:t>
             </a:fld>
             <a:endParaRPr lang="en-US" dirty="0"/>
           </a:p>
@@ -2986,7 +2986,7 @@
               <a:pPr>
                 <a:defRPr/>
               </a:pPr>
-              <a:t>Friday, February 19, 2021</a:t>
+              <a:t>Saturday, May 9, 2020</a:t>
             </a:fld>
             <a:endParaRPr lang="en-US" dirty="0"/>
           </a:p>
@@ -3247,7 +3247,7 @@
               <a:pPr>
                 <a:defRPr/>
               </a:pPr>
-              <a:t>Friday, February 19, 2021</a:t>
+              <a:t>Saturday, May 9, 2020</a:t>
             </a:fld>
             <a:endParaRPr lang="en-US"/>
           </a:p>
@@ -3550,7 +3550,7 @@
               <a:pPr>
                 <a:defRPr/>
               </a:pPr>
-              <a:t>Friday, February 19, 2021</a:t>
+              <a:t>Saturday, May 9, 2020</a:t>
             </a:fld>
             <a:endParaRPr lang="en-US"/>
           </a:p>
@@ -3987,7 +3987,7 @@
               <a:pPr>
                 <a:defRPr/>
               </a:pPr>
-              <a:t>Friday, February 19, 2021</a:t>
+              <a:t>Saturday, May 9, 2020</a:t>
             </a:fld>
             <a:endParaRPr lang="en-US"/>
           </a:p>
@@ -4120,7 +4120,7 @@
               <a:pPr>
                 <a:defRPr/>
               </a:pPr>
-              <a:t>Friday, February 19, 2021</a:t>
+              <a:t>Saturday, May 9, 2020</a:t>
             </a:fld>
             <a:endParaRPr lang="en-US"/>
           </a:p>
@@ -4230,7 +4230,7 @@
               <a:pPr>
                 <a:defRPr/>
               </a:pPr>
-              <a:t>Friday, February 19, 2021</a:t>
+              <a:t>Saturday, May 9, 2020</a:t>
             </a:fld>
             <a:endParaRPr lang="en-US" dirty="0"/>
           </a:p>
@@ -4522,7 +4522,7 @@
               <a:pPr>
                 <a:defRPr/>
               </a:pPr>
-              <a:t>Friday, February 19, 2021</a:t>
+              <a:t>Saturday, May 9, 2020</a:t>
             </a:fld>
             <a:endParaRPr lang="en-US"/>
           </a:p>
@@ -4790,7 +4790,7 @@
               <a:pPr>
                 <a:defRPr/>
               </a:pPr>
-              <a:t>Friday, February 19, 2021</a:t>
+              <a:t>Saturday, May 9, 2020</a:t>
             </a:fld>
             <a:endParaRPr lang="en-US"/>
           </a:p>
@@ -5018,7 +5018,7 @@
               <a:pPr>
                 <a:defRPr/>
               </a:pPr>
-              <a:t>Friday, February 19, 2021</a:t>
+              <a:t>Saturday, May 9, 2020</a:t>
             </a:fld>
             <a:endParaRPr lang="en-US" dirty="0"/>
           </a:p>
@@ -6117,11 +6117,11 @@
   <p:clrMapOvr>
     <a:masterClrMapping/>
   </p:clrMapOvr>
-  <mc:AlternateContent xmlns:mc="http://schemas.openxmlformats.org/markup-compatibility/2006" xmlns:p14="http://schemas.microsoft.com/office/powerpoint/2010/main">
-    <mc:Choice Requires="p14">
+  <mc:AlternateContent xmlns:mc="http://schemas.openxmlformats.org/markup-compatibility/2006">
+    <mc:Choice xmlns:p14="http://schemas.microsoft.com/office/powerpoint/2010/main" Requires="p14">
       <p:transition spd="slow" p14:dur="2000"/>
     </mc:Choice>
-    <mc:Fallback xmlns="">
+    <mc:Fallback>
       <p:transition spd="slow"/>
     </mc:Fallback>
   </mc:AlternateContent>

</xml_diff>